<commit_message>
Next article on cloud plan.
</commit_message>
<xml_diff>
--- a/zFiles/Architecture.pptx
+++ b/zFiles/Architecture.pptx
@@ -5,13 +5,14 @@
     <p:sldMasterId id="2147483648" r:id="rId3"/>
   </p:sldMasterIdLst>
   <p:notesMasterIdLst>
-    <p:notesMasterId r:id="rId5"/>
+    <p:notesMasterId r:id="rId6"/>
   </p:notesMasterIdLst>
   <p:handoutMasterIdLst>
-    <p:handoutMasterId r:id="rId6"/>
+    <p:handoutMasterId r:id="rId7"/>
   </p:handoutMasterIdLst>
   <p:sldIdLst>
     <p:sldId id="256" r:id="rId4"/>
+    <p:sldId id="257" r:id="rId5"/>
   </p:sldIdLst>
   <p:sldSz cx="12192000" cy="6858000"/>
   <p:notesSz cx="6858000" cy="9144000"/>
@@ -110,6 +111,11 @@
       </a:defRPr>
     </a:lvl9pPr>
   </p:defaultTextStyle>
+  <p:extLst>
+    <p:ext uri="{EFAFB233-063F-42B5-8137-9DF3F51BA10A}">
+      <p15:sldGuideLst xmlns:p15="http://schemas.microsoft.com/office/powerpoint/2012/main"/>
+    </p:ext>
+  </p:extLst>
 </p:presentation>
 </file>
 
@@ -195,7 +201,7 @@
           <a:p>
             <a:fld id="{C1452837-FBC7-4D2E-B61B-C04EDB58F698}" type="datetimeFigureOut">
               <a:rPr lang="en-GB" smtClean="0"/>
-              <a:t>22/01/2018</a:t>
+              <a:t>29/01/2018</a:t>
             </a:fld>
             <a:endParaRPr lang="en-GB"/>
           </a:p>
@@ -360,7 +366,7 @@
           <a:p>
             <a:fld id="{F014ADB5-545D-46B2-921D-48948249B367}" type="datetimeFigureOut">
               <a:rPr lang="en-GB" smtClean="0"/>
-              <a:t>22/01/2018</a:t>
+              <a:t>29/01/2018</a:t>
             </a:fld>
             <a:endParaRPr lang="en-GB"/>
           </a:p>
@@ -751,6 +757,128 @@
 </p:notes>
 </file>
 
+<file path=ppt/notesSlides/notesSlide2.xml><?xml version="1.0" encoding="utf-8"?>
+<p:notes xmlns:a="http://schemas.openxmlformats.org/drawingml/2006/main" xmlns:r="http://schemas.openxmlformats.org/officeDocument/2006/relationships" xmlns:p="http://schemas.openxmlformats.org/presentationml/2006/main">
+  <p:cSld>
+    <p:spTree>
+      <p:nvGrpSpPr>
+        <p:cNvPr id="1" name=""/>
+        <p:cNvGrpSpPr/>
+        <p:nvPr/>
+      </p:nvGrpSpPr>
+      <p:grpSpPr>
+        <a:xfrm>
+          <a:off x="0" y="0"/>
+          <a:ext cx="0" cy="0"/>
+          <a:chOff x="0" y="0"/>
+          <a:chExt cx="0" cy="0"/>
+        </a:xfrm>
+      </p:grpSpPr>
+      <p:sp>
+        <p:nvSpPr>
+          <p:cNvPr id="2" name="Slide Image Placeholder 1"/>
+          <p:cNvSpPr>
+            <a:spLocks noGrp="1" noRot="1" noChangeAspect="1"/>
+          </p:cNvSpPr>
+          <p:nvPr>
+            <p:ph type="sldImg"/>
+          </p:nvPr>
+        </p:nvSpPr>
+        <p:spPr/>
+      </p:sp>
+      <p:sp>
+        <p:nvSpPr>
+          <p:cNvPr id="3" name="Notes Placeholder 2"/>
+          <p:cNvSpPr>
+            <a:spLocks noGrp="1"/>
+          </p:cNvSpPr>
+          <p:nvPr>
+            <p:ph type="body" idx="1"/>
+          </p:nvPr>
+        </p:nvSpPr>
+        <p:spPr/>
+        <p:txBody>
+          <a:bodyPr/>
+          <a:lstStyle/>
+          <a:p>
+            <a:endParaRPr lang="en-GB"/>
+          </a:p>
+        </p:txBody>
+      </p:sp>
+      <p:sp>
+        <p:nvSpPr>
+          <p:cNvPr id="4" name="Header Placeholder 3"/>
+          <p:cNvSpPr>
+            <a:spLocks noGrp="1"/>
+          </p:cNvSpPr>
+          <p:nvPr>
+            <p:ph type="hdr" sz="quarter" idx="10"/>
+          </p:nvPr>
+        </p:nvSpPr>
+        <p:spPr/>
+        <p:txBody>
+          <a:bodyPr/>
+          <a:lstStyle/>
+          <a:p>
+            <a:endParaRPr lang="en-GB"/>
+          </a:p>
+        </p:txBody>
+      </p:sp>
+      <p:sp>
+        <p:nvSpPr>
+          <p:cNvPr id="5" name="Footer Placeholder 4"/>
+          <p:cNvSpPr>
+            <a:spLocks noGrp="1"/>
+          </p:cNvSpPr>
+          <p:nvPr>
+            <p:ph type="ftr" sz="quarter" idx="11"/>
+          </p:nvPr>
+        </p:nvSpPr>
+        <p:spPr/>
+        <p:txBody>
+          <a:bodyPr/>
+          <a:lstStyle/>
+          <a:p>
+            <a:endParaRPr lang="en-GB"/>
+          </a:p>
+        </p:txBody>
+      </p:sp>
+      <p:sp>
+        <p:nvSpPr>
+          <p:cNvPr id="6" name="Slide Number Placeholder 5"/>
+          <p:cNvSpPr>
+            <a:spLocks noGrp="1"/>
+          </p:cNvSpPr>
+          <p:nvPr>
+            <p:ph type="sldNum" sz="quarter" idx="12"/>
+          </p:nvPr>
+        </p:nvSpPr>
+        <p:spPr/>
+        <p:txBody>
+          <a:bodyPr/>
+          <a:lstStyle/>
+          <a:p>
+            <a:fld id="{15781DF0-7D77-4DDA-9282-840C177FB766}" type="slidenum">
+              <a:rPr lang="en-GB" smtClean="0"/>
+              <a:t>2</a:t>
+            </a:fld>
+            <a:endParaRPr lang="en-GB"/>
+          </a:p>
+        </p:txBody>
+      </p:sp>
+    </p:spTree>
+    <p:extLst>
+      <p:ext uri="{BB962C8B-B14F-4D97-AF65-F5344CB8AC3E}">
+        <p14:creationId xmlns:p14="http://schemas.microsoft.com/office/powerpoint/2010/main" val="1256275534"/>
+      </p:ext>
+    </p:extLst>
+  </p:cSld>
+  <p:clrMapOvr>
+    <a:masterClrMapping/>
+  </p:clrMapOvr>
+</p:notes>
+</file>
+
 <file path=ppt/slideLayouts/slideLayout1.xml><?xml version="1.0" encoding="utf-8"?>
 <p:sldLayout xmlns:a="http://schemas.openxmlformats.org/drawingml/2006/main" xmlns:r="http://schemas.openxmlformats.org/officeDocument/2006/relationships" xmlns:p="http://schemas.openxmlformats.org/presentationml/2006/main" type="title" preserve="1">
   <p:cSld name="Title Slide">
@@ -882,7 +1010,7 @@
           <a:p>
             <a:fld id="{1E834611-9C5B-4A42-8C94-2BA59E568BE6}" type="datetimeFigureOut">
               <a:rPr lang="en-GB" smtClean="0"/>
-              <a:t>22/01/2018</a:t>
+              <a:t>29/01/2018</a:t>
             </a:fld>
             <a:endParaRPr lang="en-GB"/>
           </a:p>
@@ -1052,7 +1180,7 @@
           <a:p>
             <a:fld id="{1E834611-9C5B-4A42-8C94-2BA59E568BE6}" type="datetimeFigureOut">
               <a:rPr lang="en-GB" smtClean="0"/>
-              <a:t>22/01/2018</a:t>
+              <a:t>29/01/2018</a:t>
             </a:fld>
             <a:endParaRPr lang="en-GB"/>
           </a:p>
@@ -1232,7 +1360,7 @@
           <a:p>
             <a:fld id="{1E834611-9C5B-4A42-8C94-2BA59E568BE6}" type="datetimeFigureOut">
               <a:rPr lang="en-GB" smtClean="0"/>
-              <a:t>22/01/2018</a:t>
+              <a:t>29/01/2018</a:t>
             </a:fld>
             <a:endParaRPr lang="en-GB"/>
           </a:p>
@@ -1402,7 +1530,7 @@
           <a:p>
             <a:fld id="{1E834611-9C5B-4A42-8C94-2BA59E568BE6}" type="datetimeFigureOut">
               <a:rPr lang="en-GB" smtClean="0"/>
-              <a:t>22/01/2018</a:t>
+              <a:t>29/01/2018</a:t>
             </a:fld>
             <a:endParaRPr lang="en-GB"/>
           </a:p>
@@ -1648,7 +1776,7 @@
           <a:p>
             <a:fld id="{1E834611-9C5B-4A42-8C94-2BA59E568BE6}" type="datetimeFigureOut">
               <a:rPr lang="en-GB" smtClean="0"/>
-              <a:t>22/01/2018</a:t>
+              <a:t>29/01/2018</a:t>
             </a:fld>
             <a:endParaRPr lang="en-GB"/>
           </a:p>
@@ -1880,7 +2008,7 @@
           <a:p>
             <a:fld id="{1E834611-9C5B-4A42-8C94-2BA59E568BE6}" type="datetimeFigureOut">
               <a:rPr lang="en-GB" smtClean="0"/>
-              <a:t>22/01/2018</a:t>
+              <a:t>29/01/2018</a:t>
             </a:fld>
             <a:endParaRPr lang="en-GB"/>
           </a:p>
@@ -2247,7 +2375,7 @@
           <a:p>
             <a:fld id="{1E834611-9C5B-4A42-8C94-2BA59E568BE6}" type="datetimeFigureOut">
               <a:rPr lang="en-GB" smtClean="0"/>
-              <a:t>22/01/2018</a:t>
+              <a:t>29/01/2018</a:t>
             </a:fld>
             <a:endParaRPr lang="en-GB"/>
           </a:p>
@@ -2365,7 +2493,7 @@
           <a:p>
             <a:fld id="{1E834611-9C5B-4A42-8C94-2BA59E568BE6}" type="datetimeFigureOut">
               <a:rPr lang="en-GB" smtClean="0"/>
-              <a:t>22/01/2018</a:t>
+              <a:t>29/01/2018</a:t>
             </a:fld>
             <a:endParaRPr lang="en-GB"/>
           </a:p>
@@ -2460,7 +2588,7 @@
           <a:p>
             <a:fld id="{1E834611-9C5B-4A42-8C94-2BA59E568BE6}" type="datetimeFigureOut">
               <a:rPr lang="en-GB" smtClean="0"/>
-              <a:t>22/01/2018</a:t>
+              <a:t>29/01/2018</a:t>
             </a:fld>
             <a:endParaRPr lang="en-GB"/>
           </a:p>
@@ -2737,7 +2865,7 @@
           <a:p>
             <a:fld id="{1E834611-9C5B-4A42-8C94-2BA59E568BE6}" type="datetimeFigureOut">
               <a:rPr lang="en-GB" smtClean="0"/>
-              <a:t>22/01/2018</a:t>
+              <a:t>29/01/2018</a:t>
             </a:fld>
             <a:endParaRPr lang="en-GB"/>
           </a:p>
@@ -2990,7 +3118,7 @@
           <a:p>
             <a:fld id="{1E834611-9C5B-4A42-8C94-2BA59E568BE6}" type="datetimeFigureOut">
               <a:rPr lang="en-GB" smtClean="0"/>
-              <a:t>22/01/2018</a:t>
+              <a:t>29/01/2018</a:t>
             </a:fld>
             <a:endParaRPr lang="en-GB"/>
           </a:p>
@@ -3203,7 +3331,7 @@
           <a:p>
             <a:fld id="{1E834611-9C5B-4A42-8C94-2BA59E568BE6}" type="datetimeFigureOut">
               <a:rPr lang="en-GB" smtClean="0"/>
-              <a:t>22/01/2018</a:t>
+              <a:t>29/01/2018</a:t>
             </a:fld>
             <a:endParaRPr lang="en-GB"/>
           </a:p>
@@ -4992,6 +5120,1423 @@
     <p:extLst>
       <p:ext uri="{BB962C8B-B14F-4D97-AF65-F5344CB8AC3E}">
         <p14:creationId xmlns:p14="http://schemas.microsoft.com/office/powerpoint/2010/main" val="3908981442"/>
+      </p:ext>
+    </p:extLst>
+  </p:cSld>
+  <p:clrMapOvr>
+    <a:masterClrMapping/>
+  </p:clrMapOvr>
+  <p:timing>
+    <p:tnLst>
+      <p:par>
+        <p:cTn id="1" dur="indefinite" restart="never" nodeType="tmRoot"/>
+      </p:par>
+    </p:tnLst>
+  </p:timing>
+</p:sld>
+</file>
+
+<file path=ppt/slides/slide2.xml><?xml version="1.0" encoding="utf-8"?>
+<p:sld xmlns:a="http://schemas.openxmlformats.org/drawingml/2006/main" xmlns:r="http://schemas.openxmlformats.org/officeDocument/2006/relationships" xmlns:p="http://schemas.openxmlformats.org/presentationml/2006/main">
+  <p:cSld>
+    <p:spTree>
+      <p:nvGrpSpPr>
+        <p:cNvPr id="1" name=""/>
+        <p:cNvGrpSpPr/>
+        <p:nvPr/>
+      </p:nvGrpSpPr>
+      <p:grpSpPr>
+        <a:xfrm>
+          <a:off x="0" y="0"/>
+          <a:ext cx="0" cy="0"/>
+          <a:chOff x="0" y="0"/>
+          <a:chExt cx="0" cy="0"/>
+        </a:xfrm>
+      </p:grpSpPr>
+      <p:pic>
+        <p:nvPicPr>
+          <p:cNvPr id="1026" name="Picture 2" descr="https://kyleferg.com/content/images/2017/03/docker-kube-1.png"/>
+          <p:cNvPicPr>
+            <a:picLocks noChangeAspect="1" noChangeArrowheads="1"/>
+          </p:cNvPicPr>
+          <p:nvPr/>
+        </p:nvPicPr>
+        <p:blipFill>
+          <a:blip r:embed="rId3" cstate="print">
+            <a:extLst>
+              <a:ext uri="{28A0092B-C50C-407E-A947-70E740481C1C}">
+                <a14:useLocalDpi xmlns:a14="http://schemas.microsoft.com/office/drawing/2010/main" val="0"/>
+              </a:ext>
+            </a:extLst>
+          </a:blip>
+          <a:srcRect/>
+          <a:stretch>
+            <a:fillRect/>
+          </a:stretch>
+        </p:blipFill>
+        <p:spPr bwMode="auto">
+          <a:xfrm>
+            <a:off x="3368059" y="705866"/>
+            <a:ext cx="1001102" cy="615772"/>
+          </a:xfrm>
+          <a:prstGeom prst="rect">
+            <a:avLst/>
+          </a:prstGeom>
+          <a:noFill/>
+          <a:extLst>
+            <a:ext uri="{909E8E84-426E-40DD-AFC4-6F175D3DCCD1}">
+              <a14:hiddenFill xmlns:a14="http://schemas.microsoft.com/office/drawing/2010/main">
+                <a:solidFill>
+                  <a:srgbClr val="FFFFFF"/>
+                </a:solidFill>
+              </a14:hiddenFill>
+            </a:ext>
+          </a:extLst>
+        </p:spPr>
+      </p:pic>
+      <p:sp>
+        <p:nvSpPr>
+          <p:cNvPr id="22" name="Rounded Rectangle 21"/>
+          <p:cNvSpPr/>
+          <p:nvPr/>
+        </p:nvSpPr>
+        <p:spPr>
+          <a:xfrm>
+            <a:off x="3368431" y="734646"/>
+            <a:ext cx="4556369" cy="5298831"/>
+          </a:xfrm>
+          <a:prstGeom prst="roundRect">
+            <a:avLst>
+              <a:gd name="adj" fmla="val 2087"/>
+            </a:avLst>
+          </a:prstGeom>
+          <a:noFill/>
+          <a:ln w="25400">
+            <a:prstDash val="dash"/>
+          </a:ln>
+        </p:spPr>
+        <p:style>
+          <a:lnRef idx="2">
+            <a:schemeClr val="accent1">
+              <a:shade val="50000"/>
+            </a:schemeClr>
+          </a:lnRef>
+          <a:fillRef idx="1">
+            <a:schemeClr val="accent1"/>
+          </a:fillRef>
+          <a:effectRef idx="0">
+            <a:schemeClr val="accent1"/>
+          </a:effectRef>
+          <a:fontRef idx="minor">
+            <a:schemeClr val="lt1"/>
+          </a:fontRef>
+        </p:style>
+        <p:txBody>
+          <a:bodyPr rtlCol="0" anchor="ctr"/>
+          <a:lstStyle/>
+          <a:p>
+            <a:pPr algn="ctr"/>
+            <a:endParaRPr lang="en-GB"/>
+          </a:p>
+        </p:txBody>
+      </p:sp>
+      <p:sp>
+        <p:nvSpPr>
+          <p:cNvPr id="4" name="Rounded Rectangle 3"/>
+          <p:cNvSpPr/>
+          <p:nvPr/>
+        </p:nvSpPr>
+        <p:spPr>
+          <a:xfrm>
+            <a:off x="4290272" y="1460962"/>
+            <a:ext cx="2712685" cy="1117140"/>
+          </a:xfrm>
+          <a:prstGeom prst="roundRect">
+            <a:avLst/>
+          </a:prstGeom>
+          <a:solidFill>
+            <a:schemeClr val="accent1">
+              <a:alpha val="34000"/>
+            </a:schemeClr>
+          </a:solidFill>
+          <a:ln>
+            <a:prstDash val="sysDot"/>
+          </a:ln>
+        </p:spPr>
+        <p:style>
+          <a:lnRef idx="2">
+            <a:schemeClr val="accent1">
+              <a:shade val="50000"/>
+            </a:schemeClr>
+          </a:lnRef>
+          <a:fillRef idx="1">
+            <a:schemeClr val="accent1"/>
+          </a:fillRef>
+          <a:effectRef idx="0">
+            <a:schemeClr val="accent1"/>
+          </a:effectRef>
+          <a:fontRef idx="minor">
+            <a:schemeClr val="lt1"/>
+          </a:fontRef>
+        </p:style>
+        <p:txBody>
+          <a:bodyPr rtlCol="0" anchor="t" anchorCtr="0"/>
+          <a:lstStyle/>
+          <a:p>
+            <a:pPr algn="ctr"/>
+            <a:r>
+              <a:rPr lang="en-GB" dirty="0" smtClean="0">
+                <a:solidFill>
+                  <a:schemeClr val="tx1"/>
+                </a:solidFill>
+              </a:rPr>
+              <a:t>Microservice</a:t>
+            </a:r>
+            <a:endParaRPr lang="en-GB" dirty="0">
+              <a:solidFill>
+                <a:schemeClr val="tx1"/>
+              </a:solidFill>
+            </a:endParaRPr>
+          </a:p>
+        </p:txBody>
+      </p:sp>
+      <p:sp>
+        <p:nvSpPr>
+          <p:cNvPr id="5" name="Cube 4"/>
+          <p:cNvSpPr/>
+          <p:nvPr/>
+        </p:nvSpPr>
+        <p:spPr>
+          <a:xfrm>
+            <a:off x="4694775" y="1917989"/>
+            <a:ext cx="786653" cy="437029"/>
+          </a:xfrm>
+          <a:prstGeom prst="cube">
+            <a:avLst/>
+          </a:prstGeom>
+        </p:spPr>
+        <p:style>
+          <a:lnRef idx="2">
+            <a:schemeClr val="accent1">
+              <a:shade val="50000"/>
+            </a:schemeClr>
+          </a:lnRef>
+          <a:fillRef idx="1">
+            <a:schemeClr val="accent1"/>
+          </a:fillRef>
+          <a:effectRef idx="0">
+            <a:schemeClr val="accent1"/>
+          </a:effectRef>
+          <a:fontRef idx="minor">
+            <a:schemeClr val="lt1"/>
+          </a:fontRef>
+        </p:style>
+        <p:txBody>
+          <a:bodyPr rtlCol="0" anchor="ctr"/>
+          <a:lstStyle/>
+          <a:p>
+            <a:pPr algn="ctr"/>
+            <a:endParaRPr lang="en-GB"/>
+          </a:p>
+        </p:txBody>
+      </p:sp>
+      <p:sp>
+        <p:nvSpPr>
+          <p:cNvPr id="6" name="Can 5"/>
+          <p:cNvSpPr/>
+          <p:nvPr/>
+        </p:nvSpPr>
+        <p:spPr>
+          <a:xfrm>
+            <a:off x="6086661" y="1931435"/>
+            <a:ext cx="517712" cy="410136"/>
+          </a:xfrm>
+          <a:prstGeom prst="can">
+            <a:avLst/>
+          </a:prstGeom>
+        </p:spPr>
+        <p:style>
+          <a:lnRef idx="2">
+            <a:schemeClr val="accent1">
+              <a:shade val="50000"/>
+            </a:schemeClr>
+          </a:lnRef>
+          <a:fillRef idx="1">
+            <a:schemeClr val="accent1"/>
+          </a:fillRef>
+          <a:effectRef idx="0">
+            <a:schemeClr val="accent1"/>
+          </a:effectRef>
+          <a:fontRef idx="minor">
+            <a:schemeClr val="lt1"/>
+          </a:fontRef>
+        </p:style>
+        <p:txBody>
+          <a:bodyPr rtlCol="0" anchor="ctr"/>
+          <a:lstStyle/>
+          <a:p>
+            <a:pPr algn="ctr"/>
+            <a:endParaRPr lang="en-GB"/>
+          </a:p>
+        </p:txBody>
+      </p:sp>
+      <p:cxnSp>
+        <p:nvCxnSpPr>
+          <p:cNvPr id="8" name="Straight Arrow Connector 7"/>
+          <p:cNvCxnSpPr>
+            <a:endCxn id="6" idx="2"/>
+          </p:cNvCxnSpPr>
+          <p:nvPr/>
+        </p:nvCxnSpPr>
+        <p:spPr>
+          <a:xfrm>
+            <a:off x="5481428" y="2136503"/>
+            <a:ext cx="605233" cy="0"/>
+          </a:xfrm>
+          <a:prstGeom prst="straightConnector1">
+            <a:avLst/>
+          </a:prstGeom>
+          <a:ln w="12700">
+            <a:solidFill>
+              <a:srgbClr val="41719C"/>
+            </a:solidFill>
+            <a:tailEnd type="triangle"/>
+          </a:ln>
+        </p:spPr>
+        <p:style>
+          <a:lnRef idx="1">
+            <a:schemeClr val="accent1"/>
+          </a:lnRef>
+          <a:fillRef idx="0">
+            <a:schemeClr val="accent1"/>
+          </a:fillRef>
+          <a:effectRef idx="0">
+            <a:schemeClr val="accent1"/>
+          </a:effectRef>
+          <a:fontRef idx="minor">
+            <a:schemeClr val="tx1"/>
+          </a:fontRef>
+        </p:style>
+      </p:cxnSp>
+      <p:sp>
+        <p:nvSpPr>
+          <p:cNvPr id="12" name="Rounded Rectangle 11"/>
+          <p:cNvSpPr/>
+          <p:nvPr/>
+        </p:nvSpPr>
+        <p:spPr>
+          <a:xfrm>
+            <a:off x="4290272" y="2825491"/>
+            <a:ext cx="2712685" cy="1117140"/>
+          </a:xfrm>
+          <a:prstGeom prst="roundRect">
+            <a:avLst/>
+          </a:prstGeom>
+          <a:solidFill>
+            <a:schemeClr val="accent1">
+              <a:alpha val="34000"/>
+            </a:schemeClr>
+          </a:solidFill>
+          <a:ln>
+            <a:prstDash val="sysDot"/>
+          </a:ln>
+        </p:spPr>
+        <p:style>
+          <a:lnRef idx="2">
+            <a:schemeClr val="accent1">
+              <a:shade val="50000"/>
+            </a:schemeClr>
+          </a:lnRef>
+          <a:fillRef idx="1">
+            <a:schemeClr val="accent1"/>
+          </a:fillRef>
+          <a:effectRef idx="0">
+            <a:schemeClr val="accent1"/>
+          </a:effectRef>
+          <a:fontRef idx="minor">
+            <a:schemeClr val="lt1"/>
+          </a:fontRef>
+        </p:style>
+        <p:txBody>
+          <a:bodyPr rtlCol="0" anchor="t" anchorCtr="0"/>
+          <a:lstStyle/>
+          <a:p>
+            <a:pPr algn="ctr"/>
+            <a:r>
+              <a:rPr lang="en-GB" dirty="0" smtClean="0">
+                <a:solidFill>
+                  <a:schemeClr val="tx1"/>
+                </a:solidFill>
+              </a:rPr>
+              <a:t>Microservice</a:t>
+            </a:r>
+            <a:endParaRPr lang="en-GB" dirty="0">
+              <a:solidFill>
+                <a:schemeClr val="tx1"/>
+              </a:solidFill>
+            </a:endParaRPr>
+          </a:p>
+        </p:txBody>
+      </p:sp>
+      <p:sp>
+        <p:nvSpPr>
+          <p:cNvPr id="13" name="Cube 12"/>
+          <p:cNvSpPr/>
+          <p:nvPr/>
+        </p:nvSpPr>
+        <p:spPr>
+          <a:xfrm>
+            <a:off x="4694775" y="3282518"/>
+            <a:ext cx="786653" cy="437029"/>
+          </a:xfrm>
+          <a:prstGeom prst="cube">
+            <a:avLst/>
+          </a:prstGeom>
+        </p:spPr>
+        <p:style>
+          <a:lnRef idx="2">
+            <a:schemeClr val="accent1">
+              <a:shade val="50000"/>
+            </a:schemeClr>
+          </a:lnRef>
+          <a:fillRef idx="1">
+            <a:schemeClr val="accent1"/>
+          </a:fillRef>
+          <a:effectRef idx="0">
+            <a:schemeClr val="accent1"/>
+          </a:effectRef>
+          <a:fontRef idx="minor">
+            <a:schemeClr val="lt1"/>
+          </a:fontRef>
+        </p:style>
+        <p:txBody>
+          <a:bodyPr rtlCol="0" anchor="ctr"/>
+          <a:lstStyle/>
+          <a:p>
+            <a:pPr algn="ctr"/>
+            <a:endParaRPr lang="en-GB"/>
+          </a:p>
+        </p:txBody>
+      </p:sp>
+      <p:sp>
+        <p:nvSpPr>
+          <p:cNvPr id="14" name="Can 13"/>
+          <p:cNvSpPr/>
+          <p:nvPr/>
+        </p:nvSpPr>
+        <p:spPr>
+          <a:xfrm>
+            <a:off x="6086661" y="3295964"/>
+            <a:ext cx="517712" cy="410136"/>
+          </a:xfrm>
+          <a:prstGeom prst="can">
+            <a:avLst/>
+          </a:prstGeom>
+        </p:spPr>
+        <p:style>
+          <a:lnRef idx="2">
+            <a:schemeClr val="accent1">
+              <a:shade val="50000"/>
+            </a:schemeClr>
+          </a:lnRef>
+          <a:fillRef idx="1">
+            <a:schemeClr val="accent1"/>
+          </a:fillRef>
+          <a:effectRef idx="0">
+            <a:schemeClr val="accent1"/>
+          </a:effectRef>
+          <a:fontRef idx="minor">
+            <a:schemeClr val="lt1"/>
+          </a:fontRef>
+        </p:style>
+        <p:txBody>
+          <a:bodyPr rtlCol="0" anchor="ctr"/>
+          <a:lstStyle/>
+          <a:p>
+            <a:pPr algn="ctr"/>
+            <a:endParaRPr lang="en-GB"/>
+          </a:p>
+        </p:txBody>
+      </p:sp>
+      <p:cxnSp>
+        <p:nvCxnSpPr>
+          <p:cNvPr id="15" name="Straight Arrow Connector 14"/>
+          <p:cNvCxnSpPr>
+            <a:endCxn id="14" idx="2"/>
+          </p:cNvCxnSpPr>
+          <p:nvPr/>
+        </p:nvCxnSpPr>
+        <p:spPr>
+          <a:xfrm>
+            <a:off x="5481428" y="3501032"/>
+            <a:ext cx="605233" cy="0"/>
+          </a:xfrm>
+          <a:prstGeom prst="straightConnector1">
+            <a:avLst/>
+          </a:prstGeom>
+          <a:ln w="12700">
+            <a:solidFill>
+              <a:srgbClr val="41719C"/>
+            </a:solidFill>
+            <a:tailEnd type="triangle"/>
+          </a:ln>
+        </p:spPr>
+        <p:style>
+          <a:lnRef idx="1">
+            <a:schemeClr val="accent1"/>
+          </a:lnRef>
+          <a:fillRef idx="0">
+            <a:schemeClr val="accent1"/>
+          </a:fillRef>
+          <a:effectRef idx="0">
+            <a:schemeClr val="accent1"/>
+          </a:effectRef>
+          <a:fontRef idx="minor">
+            <a:schemeClr val="tx1"/>
+          </a:fontRef>
+        </p:style>
+      </p:cxnSp>
+      <p:sp>
+        <p:nvSpPr>
+          <p:cNvPr id="17" name="Rounded Rectangle 16"/>
+          <p:cNvSpPr/>
+          <p:nvPr/>
+        </p:nvSpPr>
+        <p:spPr>
+          <a:xfrm>
+            <a:off x="4290272" y="4190020"/>
+            <a:ext cx="2712685" cy="1117140"/>
+          </a:xfrm>
+          <a:prstGeom prst="roundRect">
+            <a:avLst/>
+          </a:prstGeom>
+          <a:solidFill>
+            <a:schemeClr val="accent1">
+              <a:alpha val="34000"/>
+            </a:schemeClr>
+          </a:solidFill>
+          <a:ln>
+            <a:prstDash val="sysDot"/>
+          </a:ln>
+        </p:spPr>
+        <p:style>
+          <a:lnRef idx="2">
+            <a:schemeClr val="accent1">
+              <a:shade val="50000"/>
+            </a:schemeClr>
+          </a:lnRef>
+          <a:fillRef idx="1">
+            <a:schemeClr val="accent1"/>
+          </a:fillRef>
+          <a:effectRef idx="0">
+            <a:schemeClr val="accent1"/>
+          </a:effectRef>
+          <a:fontRef idx="minor">
+            <a:schemeClr val="lt1"/>
+          </a:fontRef>
+        </p:style>
+        <p:txBody>
+          <a:bodyPr rtlCol="0" anchor="t" anchorCtr="0"/>
+          <a:lstStyle/>
+          <a:p>
+            <a:pPr algn="ctr"/>
+            <a:r>
+              <a:rPr lang="en-GB" dirty="0" smtClean="0">
+                <a:solidFill>
+                  <a:schemeClr val="tx1"/>
+                </a:solidFill>
+              </a:rPr>
+              <a:t>Microservice</a:t>
+            </a:r>
+            <a:endParaRPr lang="en-GB" dirty="0">
+              <a:solidFill>
+                <a:schemeClr val="tx1"/>
+              </a:solidFill>
+            </a:endParaRPr>
+          </a:p>
+        </p:txBody>
+      </p:sp>
+      <p:sp>
+        <p:nvSpPr>
+          <p:cNvPr id="18" name="Cube 17"/>
+          <p:cNvSpPr/>
+          <p:nvPr/>
+        </p:nvSpPr>
+        <p:spPr>
+          <a:xfrm>
+            <a:off x="4694775" y="4647047"/>
+            <a:ext cx="786653" cy="437029"/>
+          </a:xfrm>
+          <a:prstGeom prst="cube">
+            <a:avLst/>
+          </a:prstGeom>
+        </p:spPr>
+        <p:style>
+          <a:lnRef idx="2">
+            <a:schemeClr val="accent1">
+              <a:shade val="50000"/>
+            </a:schemeClr>
+          </a:lnRef>
+          <a:fillRef idx="1">
+            <a:schemeClr val="accent1"/>
+          </a:fillRef>
+          <a:effectRef idx="0">
+            <a:schemeClr val="accent1"/>
+          </a:effectRef>
+          <a:fontRef idx="minor">
+            <a:schemeClr val="lt1"/>
+          </a:fontRef>
+        </p:style>
+        <p:txBody>
+          <a:bodyPr rtlCol="0" anchor="ctr"/>
+          <a:lstStyle/>
+          <a:p>
+            <a:pPr algn="ctr"/>
+            <a:endParaRPr lang="en-GB"/>
+          </a:p>
+        </p:txBody>
+      </p:sp>
+      <p:sp>
+        <p:nvSpPr>
+          <p:cNvPr id="19" name="Can 18"/>
+          <p:cNvSpPr/>
+          <p:nvPr/>
+        </p:nvSpPr>
+        <p:spPr>
+          <a:xfrm>
+            <a:off x="6086661" y="4660493"/>
+            <a:ext cx="517712" cy="410136"/>
+          </a:xfrm>
+          <a:prstGeom prst="can">
+            <a:avLst/>
+          </a:prstGeom>
+        </p:spPr>
+        <p:style>
+          <a:lnRef idx="2">
+            <a:schemeClr val="accent1">
+              <a:shade val="50000"/>
+            </a:schemeClr>
+          </a:lnRef>
+          <a:fillRef idx="1">
+            <a:schemeClr val="accent1"/>
+          </a:fillRef>
+          <a:effectRef idx="0">
+            <a:schemeClr val="accent1"/>
+          </a:effectRef>
+          <a:fontRef idx="minor">
+            <a:schemeClr val="lt1"/>
+          </a:fontRef>
+        </p:style>
+        <p:txBody>
+          <a:bodyPr rtlCol="0" anchor="ctr"/>
+          <a:lstStyle/>
+          <a:p>
+            <a:pPr algn="ctr"/>
+            <a:endParaRPr lang="en-GB"/>
+          </a:p>
+        </p:txBody>
+      </p:sp>
+      <p:cxnSp>
+        <p:nvCxnSpPr>
+          <p:cNvPr id="20" name="Straight Arrow Connector 19"/>
+          <p:cNvCxnSpPr>
+            <a:endCxn id="19" idx="2"/>
+          </p:cNvCxnSpPr>
+          <p:nvPr/>
+        </p:nvCxnSpPr>
+        <p:spPr>
+          <a:xfrm>
+            <a:off x="5481428" y="4865561"/>
+            <a:ext cx="605233" cy="0"/>
+          </a:xfrm>
+          <a:prstGeom prst="straightConnector1">
+            <a:avLst/>
+          </a:prstGeom>
+          <a:ln w="12700">
+            <a:solidFill>
+              <a:srgbClr val="41719C"/>
+            </a:solidFill>
+            <a:tailEnd type="triangle"/>
+          </a:ln>
+        </p:spPr>
+        <p:style>
+          <a:lnRef idx="1">
+            <a:schemeClr val="accent1"/>
+          </a:lnRef>
+          <a:fillRef idx="0">
+            <a:schemeClr val="accent1"/>
+          </a:fillRef>
+          <a:effectRef idx="0">
+            <a:schemeClr val="accent1"/>
+          </a:effectRef>
+          <a:fontRef idx="minor">
+            <a:schemeClr val="tx1"/>
+          </a:fontRef>
+        </p:style>
+      </p:cxnSp>
+      <p:sp>
+        <p:nvSpPr>
+          <p:cNvPr id="24" name="Can 23"/>
+          <p:cNvSpPr/>
+          <p:nvPr/>
+        </p:nvSpPr>
+        <p:spPr>
+          <a:xfrm>
+            <a:off x="8607122" y="1460962"/>
+            <a:ext cx="517712" cy="3846198"/>
+          </a:xfrm>
+          <a:prstGeom prst="can">
+            <a:avLst/>
+          </a:prstGeom>
+          <a:solidFill>
+            <a:schemeClr val="accent1">
+              <a:alpha val="34000"/>
+            </a:schemeClr>
+          </a:solidFill>
+        </p:spPr>
+        <p:style>
+          <a:lnRef idx="2">
+            <a:schemeClr val="accent1">
+              <a:shade val="50000"/>
+            </a:schemeClr>
+          </a:lnRef>
+          <a:fillRef idx="1">
+            <a:schemeClr val="accent1"/>
+          </a:fillRef>
+          <a:effectRef idx="0">
+            <a:schemeClr val="accent1"/>
+          </a:effectRef>
+          <a:fontRef idx="minor">
+            <a:schemeClr val="lt1"/>
+          </a:fontRef>
+        </p:style>
+        <p:txBody>
+          <a:bodyPr vert="vert" rtlCol="0" anchor="ctr"/>
+          <a:lstStyle/>
+          <a:p>
+            <a:pPr algn="ctr"/>
+            <a:r>
+              <a:rPr lang="en-GB" dirty="0" smtClean="0">
+                <a:solidFill>
+                  <a:schemeClr val="tx1"/>
+                </a:solidFill>
+              </a:rPr>
+              <a:t>Event Bus</a:t>
+            </a:r>
+            <a:endParaRPr lang="en-GB" dirty="0">
+              <a:solidFill>
+                <a:schemeClr val="tx1"/>
+              </a:solidFill>
+            </a:endParaRPr>
+          </a:p>
+        </p:txBody>
+      </p:sp>
+      <p:cxnSp>
+        <p:nvCxnSpPr>
+          <p:cNvPr id="25" name="Straight Arrow Connector 24"/>
+          <p:cNvCxnSpPr>
+            <a:stCxn id="4" idx="3"/>
+          </p:cNvCxnSpPr>
+          <p:nvPr/>
+        </p:nvCxnSpPr>
+        <p:spPr>
+          <a:xfrm>
+            <a:off x="7002957" y="2019532"/>
+            <a:ext cx="1604165" cy="373299"/>
+          </a:xfrm>
+          <a:prstGeom prst="straightConnector1">
+            <a:avLst/>
+          </a:prstGeom>
+          <a:ln>
+            <a:solidFill>
+              <a:schemeClr val="tx1"/>
+            </a:solidFill>
+            <a:headEnd type="triangle"/>
+            <a:tailEnd type="triangle"/>
+          </a:ln>
+        </p:spPr>
+        <p:style>
+          <a:lnRef idx="1">
+            <a:schemeClr val="accent1"/>
+          </a:lnRef>
+          <a:fillRef idx="0">
+            <a:schemeClr val="accent1"/>
+          </a:fillRef>
+          <a:effectRef idx="0">
+            <a:schemeClr val="accent1"/>
+          </a:effectRef>
+          <a:fontRef idx="minor">
+            <a:schemeClr val="tx1"/>
+          </a:fontRef>
+        </p:style>
+      </p:cxnSp>
+      <p:cxnSp>
+        <p:nvCxnSpPr>
+          <p:cNvPr id="28" name="Straight Arrow Connector 27"/>
+          <p:cNvCxnSpPr>
+            <a:stCxn id="12" idx="3"/>
+            <a:endCxn id="24" idx="2"/>
+          </p:cNvCxnSpPr>
+          <p:nvPr/>
+        </p:nvCxnSpPr>
+        <p:spPr>
+          <a:xfrm>
+            <a:off x="7002957" y="3384061"/>
+            <a:ext cx="1604165" cy="0"/>
+          </a:xfrm>
+          <a:prstGeom prst="straightConnector1">
+            <a:avLst/>
+          </a:prstGeom>
+          <a:ln>
+            <a:solidFill>
+              <a:schemeClr val="tx1"/>
+            </a:solidFill>
+            <a:headEnd type="triangle"/>
+            <a:tailEnd type="triangle"/>
+          </a:ln>
+        </p:spPr>
+        <p:style>
+          <a:lnRef idx="1">
+            <a:schemeClr val="accent1"/>
+          </a:lnRef>
+          <a:fillRef idx="0">
+            <a:schemeClr val="accent1"/>
+          </a:fillRef>
+          <a:effectRef idx="0">
+            <a:schemeClr val="accent1"/>
+          </a:effectRef>
+          <a:fontRef idx="minor">
+            <a:schemeClr val="tx1"/>
+          </a:fontRef>
+        </p:style>
+      </p:cxnSp>
+      <p:cxnSp>
+        <p:nvCxnSpPr>
+          <p:cNvPr id="31" name="Straight Arrow Connector 30"/>
+          <p:cNvCxnSpPr>
+            <a:stCxn id="17" idx="3"/>
+          </p:cNvCxnSpPr>
+          <p:nvPr/>
+        </p:nvCxnSpPr>
+        <p:spPr>
+          <a:xfrm flipV="1">
+            <a:off x="7002957" y="4329723"/>
+            <a:ext cx="1604165" cy="418867"/>
+          </a:xfrm>
+          <a:prstGeom prst="straightConnector1">
+            <a:avLst/>
+          </a:prstGeom>
+          <a:ln>
+            <a:solidFill>
+              <a:schemeClr val="tx1"/>
+            </a:solidFill>
+            <a:headEnd type="triangle"/>
+            <a:tailEnd type="triangle"/>
+          </a:ln>
+        </p:spPr>
+        <p:style>
+          <a:lnRef idx="1">
+            <a:schemeClr val="accent1"/>
+          </a:lnRef>
+          <a:fillRef idx="0">
+            <a:schemeClr val="accent1"/>
+          </a:fillRef>
+          <a:effectRef idx="0">
+            <a:schemeClr val="accent1"/>
+          </a:effectRef>
+          <a:fontRef idx="minor">
+            <a:schemeClr val="tx1"/>
+          </a:fontRef>
+        </p:style>
+      </p:cxnSp>
+      <p:grpSp>
+        <p:nvGrpSpPr>
+          <p:cNvPr id="1030" name="Group 1029"/>
+          <p:cNvGrpSpPr/>
+          <p:nvPr/>
+        </p:nvGrpSpPr>
+        <p:grpSpPr>
+          <a:xfrm>
+            <a:off x="7287245" y="2236063"/>
+            <a:ext cx="372742" cy="211015"/>
+            <a:chOff x="883137" y="930031"/>
+            <a:chExt cx="937849" cy="530931"/>
+          </a:xfrm>
+        </p:grpSpPr>
+        <p:sp>
+          <p:nvSpPr>
+            <p:cNvPr id="1027" name="Rectangle 1026"/>
+            <p:cNvSpPr/>
+            <p:nvPr/>
+          </p:nvSpPr>
+          <p:spPr>
+            <a:xfrm>
+              <a:off x="883138" y="930031"/>
+              <a:ext cx="937847" cy="530931"/>
+            </a:xfrm>
+            <a:prstGeom prst="rect">
+              <a:avLst/>
+            </a:prstGeom>
+            <a:noFill/>
+          </p:spPr>
+          <p:style>
+            <a:lnRef idx="2">
+              <a:schemeClr val="accent1">
+                <a:shade val="50000"/>
+              </a:schemeClr>
+            </a:lnRef>
+            <a:fillRef idx="1">
+              <a:schemeClr val="accent1"/>
+            </a:fillRef>
+            <a:effectRef idx="0">
+              <a:schemeClr val="accent1"/>
+            </a:effectRef>
+            <a:fontRef idx="minor">
+              <a:schemeClr val="lt1"/>
+            </a:fontRef>
+          </p:style>
+          <p:txBody>
+            <a:bodyPr rtlCol="0" anchor="ctr"/>
+            <a:lstStyle/>
+            <a:p>
+              <a:pPr algn="ctr"/>
+              <a:endParaRPr lang="en-GB"/>
+            </a:p>
+          </p:txBody>
+        </p:sp>
+        <p:sp>
+          <p:nvSpPr>
+            <p:cNvPr id="1028" name="Trapezoid 1027"/>
+            <p:cNvSpPr/>
+            <p:nvPr/>
+          </p:nvSpPr>
+          <p:spPr>
+            <a:xfrm>
+              <a:off x="883137" y="1109785"/>
+              <a:ext cx="937848" cy="351177"/>
+            </a:xfrm>
+            <a:prstGeom prst="trapezoid">
+              <a:avLst>
+                <a:gd name="adj" fmla="val 87313"/>
+              </a:avLst>
+            </a:prstGeom>
+            <a:noFill/>
+          </p:spPr>
+          <p:style>
+            <a:lnRef idx="2">
+              <a:schemeClr val="accent1">
+                <a:shade val="50000"/>
+              </a:schemeClr>
+            </a:lnRef>
+            <a:fillRef idx="1">
+              <a:schemeClr val="accent1"/>
+            </a:fillRef>
+            <a:effectRef idx="0">
+              <a:schemeClr val="accent1"/>
+            </a:effectRef>
+            <a:fontRef idx="minor">
+              <a:schemeClr val="lt1"/>
+            </a:fontRef>
+          </p:style>
+          <p:txBody>
+            <a:bodyPr rtlCol="0" anchor="ctr"/>
+            <a:lstStyle/>
+            <a:p>
+              <a:pPr algn="ctr"/>
+              <a:endParaRPr lang="en-GB"/>
+            </a:p>
+          </p:txBody>
+        </p:sp>
+        <p:sp>
+          <p:nvSpPr>
+            <p:cNvPr id="1029" name="Isosceles Triangle 1028"/>
+            <p:cNvSpPr/>
+            <p:nvPr/>
+          </p:nvSpPr>
+          <p:spPr>
+            <a:xfrm flipV="1">
+              <a:off x="883138" y="930031"/>
+              <a:ext cx="937848" cy="355342"/>
+            </a:xfrm>
+            <a:prstGeom prst="triangle">
+              <a:avLst/>
+            </a:prstGeom>
+            <a:solidFill>
+              <a:schemeClr val="bg1"/>
+            </a:solidFill>
+          </p:spPr>
+          <p:style>
+            <a:lnRef idx="2">
+              <a:schemeClr val="accent1">
+                <a:shade val="50000"/>
+              </a:schemeClr>
+            </a:lnRef>
+            <a:fillRef idx="1">
+              <a:schemeClr val="accent1"/>
+            </a:fillRef>
+            <a:effectRef idx="0">
+              <a:schemeClr val="accent1"/>
+            </a:effectRef>
+            <a:fontRef idx="minor">
+              <a:schemeClr val="lt1"/>
+            </a:fontRef>
+          </p:style>
+          <p:txBody>
+            <a:bodyPr rtlCol="0" anchor="ctr"/>
+            <a:lstStyle/>
+            <a:p>
+              <a:pPr algn="ctr"/>
+              <a:endParaRPr lang="en-GB"/>
+            </a:p>
+          </p:txBody>
+        </p:sp>
+      </p:grpSp>
+      <p:grpSp>
+        <p:nvGrpSpPr>
+          <p:cNvPr id="39" name="Group 38"/>
+          <p:cNvGrpSpPr/>
+          <p:nvPr/>
+        </p:nvGrpSpPr>
+        <p:grpSpPr>
+          <a:xfrm>
+            <a:off x="7280338" y="3491598"/>
+            <a:ext cx="372742" cy="211015"/>
+            <a:chOff x="883137" y="930031"/>
+            <a:chExt cx="937849" cy="530931"/>
+          </a:xfrm>
+        </p:grpSpPr>
+        <p:sp>
+          <p:nvSpPr>
+            <p:cNvPr id="40" name="Rectangle 39"/>
+            <p:cNvSpPr/>
+            <p:nvPr/>
+          </p:nvSpPr>
+          <p:spPr>
+            <a:xfrm>
+              <a:off x="883138" y="930031"/>
+              <a:ext cx="937847" cy="530931"/>
+            </a:xfrm>
+            <a:prstGeom prst="rect">
+              <a:avLst/>
+            </a:prstGeom>
+            <a:noFill/>
+          </p:spPr>
+          <p:style>
+            <a:lnRef idx="2">
+              <a:schemeClr val="accent1">
+                <a:shade val="50000"/>
+              </a:schemeClr>
+            </a:lnRef>
+            <a:fillRef idx="1">
+              <a:schemeClr val="accent1"/>
+            </a:fillRef>
+            <a:effectRef idx="0">
+              <a:schemeClr val="accent1"/>
+            </a:effectRef>
+            <a:fontRef idx="minor">
+              <a:schemeClr val="lt1"/>
+            </a:fontRef>
+          </p:style>
+          <p:txBody>
+            <a:bodyPr rtlCol="0" anchor="ctr"/>
+            <a:lstStyle/>
+            <a:p>
+              <a:pPr algn="ctr"/>
+              <a:endParaRPr lang="en-GB"/>
+            </a:p>
+          </p:txBody>
+        </p:sp>
+        <p:sp>
+          <p:nvSpPr>
+            <p:cNvPr id="41" name="Trapezoid 40"/>
+            <p:cNvSpPr/>
+            <p:nvPr/>
+          </p:nvSpPr>
+          <p:spPr>
+            <a:xfrm>
+              <a:off x="883137" y="1109785"/>
+              <a:ext cx="937848" cy="351177"/>
+            </a:xfrm>
+            <a:prstGeom prst="trapezoid">
+              <a:avLst>
+                <a:gd name="adj" fmla="val 87313"/>
+              </a:avLst>
+            </a:prstGeom>
+            <a:noFill/>
+          </p:spPr>
+          <p:style>
+            <a:lnRef idx="2">
+              <a:schemeClr val="accent1">
+                <a:shade val="50000"/>
+              </a:schemeClr>
+            </a:lnRef>
+            <a:fillRef idx="1">
+              <a:schemeClr val="accent1"/>
+            </a:fillRef>
+            <a:effectRef idx="0">
+              <a:schemeClr val="accent1"/>
+            </a:effectRef>
+            <a:fontRef idx="minor">
+              <a:schemeClr val="lt1"/>
+            </a:fontRef>
+          </p:style>
+          <p:txBody>
+            <a:bodyPr rtlCol="0" anchor="ctr"/>
+            <a:lstStyle/>
+            <a:p>
+              <a:pPr algn="ctr"/>
+              <a:endParaRPr lang="en-GB"/>
+            </a:p>
+          </p:txBody>
+        </p:sp>
+        <p:sp>
+          <p:nvSpPr>
+            <p:cNvPr id="42" name="Isosceles Triangle 41"/>
+            <p:cNvSpPr/>
+            <p:nvPr/>
+          </p:nvSpPr>
+          <p:spPr>
+            <a:xfrm flipV="1">
+              <a:off x="883138" y="930031"/>
+              <a:ext cx="937848" cy="355342"/>
+            </a:xfrm>
+            <a:prstGeom prst="triangle">
+              <a:avLst/>
+            </a:prstGeom>
+            <a:solidFill>
+              <a:schemeClr val="bg1"/>
+            </a:solidFill>
+          </p:spPr>
+          <p:style>
+            <a:lnRef idx="2">
+              <a:schemeClr val="accent1">
+                <a:shade val="50000"/>
+              </a:schemeClr>
+            </a:lnRef>
+            <a:fillRef idx="1">
+              <a:schemeClr val="accent1"/>
+            </a:fillRef>
+            <a:effectRef idx="0">
+              <a:schemeClr val="accent1"/>
+            </a:effectRef>
+            <a:fontRef idx="minor">
+              <a:schemeClr val="lt1"/>
+            </a:fontRef>
+          </p:style>
+          <p:txBody>
+            <a:bodyPr rtlCol="0" anchor="ctr"/>
+            <a:lstStyle/>
+            <a:p>
+              <a:pPr algn="ctr"/>
+              <a:endParaRPr lang="en-GB"/>
+            </a:p>
+          </p:txBody>
+        </p:sp>
+      </p:grpSp>
+      <p:grpSp>
+        <p:nvGrpSpPr>
+          <p:cNvPr id="43" name="Group 42"/>
+          <p:cNvGrpSpPr/>
+          <p:nvPr/>
+        </p:nvGrpSpPr>
+        <p:grpSpPr>
+          <a:xfrm>
+            <a:off x="7277507" y="4816859"/>
+            <a:ext cx="372742" cy="211015"/>
+            <a:chOff x="883137" y="930031"/>
+            <a:chExt cx="937849" cy="530931"/>
+          </a:xfrm>
+        </p:grpSpPr>
+        <p:sp>
+          <p:nvSpPr>
+            <p:cNvPr id="44" name="Rectangle 43"/>
+            <p:cNvSpPr/>
+            <p:nvPr/>
+          </p:nvSpPr>
+          <p:spPr>
+            <a:xfrm>
+              <a:off x="883138" y="930031"/>
+              <a:ext cx="937847" cy="530931"/>
+            </a:xfrm>
+            <a:prstGeom prst="rect">
+              <a:avLst/>
+            </a:prstGeom>
+            <a:noFill/>
+          </p:spPr>
+          <p:style>
+            <a:lnRef idx="2">
+              <a:schemeClr val="accent1">
+                <a:shade val="50000"/>
+              </a:schemeClr>
+            </a:lnRef>
+            <a:fillRef idx="1">
+              <a:schemeClr val="accent1"/>
+            </a:fillRef>
+            <a:effectRef idx="0">
+              <a:schemeClr val="accent1"/>
+            </a:effectRef>
+            <a:fontRef idx="minor">
+              <a:schemeClr val="lt1"/>
+            </a:fontRef>
+          </p:style>
+          <p:txBody>
+            <a:bodyPr rtlCol="0" anchor="ctr"/>
+            <a:lstStyle/>
+            <a:p>
+              <a:pPr algn="ctr"/>
+              <a:endParaRPr lang="en-GB"/>
+            </a:p>
+          </p:txBody>
+        </p:sp>
+        <p:sp>
+          <p:nvSpPr>
+            <p:cNvPr id="45" name="Trapezoid 44"/>
+            <p:cNvSpPr/>
+            <p:nvPr/>
+          </p:nvSpPr>
+          <p:spPr>
+            <a:xfrm>
+              <a:off x="883137" y="1109785"/>
+              <a:ext cx="937848" cy="351177"/>
+            </a:xfrm>
+            <a:prstGeom prst="trapezoid">
+              <a:avLst>
+                <a:gd name="adj" fmla="val 87313"/>
+              </a:avLst>
+            </a:prstGeom>
+            <a:noFill/>
+          </p:spPr>
+          <p:style>
+            <a:lnRef idx="2">
+              <a:schemeClr val="accent1">
+                <a:shade val="50000"/>
+              </a:schemeClr>
+            </a:lnRef>
+            <a:fillRef idx="1">
+              <a:schemeClr val="accent1"/>
+            </a:fillRef>
+            <a:effectRef idx="0">
+              <a:schemeClr val="accent1"/>
+            </a:effectRef>
+            <a:fontRef idx="minor">
+              <a:schemeClr val="lt1"/>
+            </a:fontRef>
+          </p:style>
+          <p:txBody>
+            <a:bodyPr rtlCol="0" anchor="ctr"/>
+            <a:lstStyle/>
+            <a:p>
+              <a:pPr algn="ctr"/>
+              <a:endParaRPr lang="en-GB"/>
+            </a:p>
+          </p:txBody>
+        </p:sp>
+        <p:sp>
+          <p:nvSpPr>
+            <p:cNvPr id="46" name="Isosceles Triangle 45"/>
+            <p:cNvSpPr/>
+            <p:nvPr/>
+          </p:nvSpPr>
+          <p:spPr>
+            <a:xfrm flipV="1">
+              <a:off x="883138" y="930031"/>
+              <a:ext cx="937848" cy="355342"/>
+            </a:xfrm>
+            <a:prstGeom prst="triangle">
+              <a:avLst/>
+            </a:prstGeom>
+            <a:solidFill>
+              <a:schemeClr val="bg1"/>
+            </a:solidFill>
+          </p:spPr>
+          <p:style>
+            <a:lnRef idx="2">
+              <a:schemeClr val="accent1">
+                <a:shade val="50000"/>
+              </a:schemeClr>
+            </a:lnRef>
+            <a:fillRef idx="1">
+              <a:schemeClr val="accent1"/>
+            </a:fillRef>
+            <a:effectRef idx="0">
+              <a:schemeClr val="accent1"/>
+            </a:effectRef>
+            <a:fontRef idx="minor">
+              <a:schemeClr val="lt1"/>
+            </a:fontRef>
+          </p:style>
+          <p:txBody>
+            <a:bodyPr rtlCol="0" anchor="ctr"/>
+            <a:lstStyle/>
+            <a:p>
+              <a:pPr algn="ctr"/>
+              <a:endParaRPr lang="en-GB"/>
+            </a:p>
+          </p:txBody>
+        </p:sp>
+      </p:grpSp>
+      <p:sp>
+        <p:nvSpPr>
+          <p:cNvPr id="1031" name="Cloud 1030"/>
+          <p:cNvSpPr/>
+          <p:nvPr/>
+        </p:nvSpPr>
+        <p:spPr>
+          <a:xfrm>
+            <a:off x="786395" y="2874559"/>
+            <a:ext cx="1586523" cy="1019003"/>
+          </a:xfrm>
+          <a:prstGeom prst="cloud">
+            <a:avLst/>
+          </a:prstGeom>
+        </p:spPr>
+        <p:style>
+          <a:lnRef idx="2">
+            <a:schemeClr val="accent1">
+              <a:shade val="50000"/>
+            </a:schemeClr>
+          </a:lnRef>
+          <a:fillRef idx="1">
+            <a:schemeClr val="accent1"/>
+          </a:fillRef>
+          <a:effectRef idx="0">
+            <a:schemeClr val="accent1"/>
+          </a:effectRef>
+          <a:fontRef idx="minor">
+            <a:schemeClr val="lt1"/>
+          </a:fontRef>
+        </p:style>
+        <p:txBody>
+          <a:bodyPr rtlCol="0" anchor="ctr"/>
+          <a:lstStyle/>
+          <a:p>
+            <a:pPr algn="ctr"/>
+            <a:endParaRPr lang="en-GB"/>
+          </a:p>
+        </p:txBody>
+      </p:sp>
+      <p:cxnSp>
+        <p:nvCxnSpPr>
+          <p:cNvPr id="48" name="Straight Arrow Connector 47"/>
+          <p:cNvCxnSpPr>
+            <a:endCxn id="4" idx="1"/>
+          </p:cNvCxnSpPr>
+          <p:nvPr/>
+        </p:nvCxnSpPr>
+        <p:spPr>
+          <a:xfrm flipV="1">
+            <a:off x="2289908" y="2019532"/>
+            <a:ext cx="2000364" cy="1036283"/>
+          </a:xfrm>
+          <a:prstGeom prst="straightConnector1">
+            <a:avLst/>
+          </a:prstGeom>
+          <a:ln>
+            <a:solidFill>
+              <a:schemeClr val="tx1"/>
+            </a:solidFill>
+            <a:headEnd type="none"/>
+            <a:tailEnd type="triangle"/>
+          </a:ln>
+        </p:spPr>
+        <p:style>
+          <a:lnRef idx="1">
+            <a:schemeClr val="accent1"/>
+          </a:lnRef>
+          <a:fillRef idx="0">
+            <a:schemeClr val="accent1"/>
+          </a:fillRef>
+          <a:effectRef idx="0">
+            <a:schemeClr val="accent1"/>
+          </a:effectRef>
+          <a:fontRef idx="minor">
+            <a:schemeClr val="tx1"/>
+          </a:fontRef>
+        </p:style>
+      </p:cxnSp>
+      <p:cxnSp>
+        <p:nvCxnSpPr>
+          <p:cNvPr id="52" name="Straight Arrow Connector 51"/>
+          <p:cNvCxnSpPr>
+            <a:stCxn id="1031" idx="0"/>
+            <a:endCxn id="12" idx="1"/>
+          </p:cNvCxnSpPr>
+          <p:nvPr/>
+        </p:nvCxnSpPr>
+        <p:spPr>
+          <a:xfrm>
+            <a:off x="2371596" y="3384061"/>
+            <a:ext cx="1918676" cy="0"/>
+          </a:xfrm>
+          <a:prstGeom prst="straightConnector1">
+            <a:avLst/>
+          </a:prstGeom>
+          <a:ln>
+            <a:solidFill>
+              <a:schemeClr val="tx1"/>
+            </a:solidFill>
+            <a:headEnd type="none"/>
+            <a:tailEnd type="triangle"/>
+          </a:ln>
+        </p:spPr>
+        <p:style>
+          <a:lnRef idx="1">
+            <a:schemeClr val="accent1"/>
+          </a:lnRef>
+          <a:fillRef idx="0">
+            <a:schemeClr val="accent1"/>
+          </a:fillRef>
+          <a:effectRef idx="0">
+            <a:schemeClr val="accent1"/>
+          </a:effectRef>
+          <a:fontRef idx="minor">
+            <a:schemeClr val="tx1"/>
+          </a:fontRef>
+        </p:style>
+      </p:cxnSp>
+      <p:cxnSp>
+        <p:nvCxnSpPr>
+          <p:cNvPr id="55" name="Straight Arrow Connector 54"/>
+          <p:cNvCxnSpPr>
+            <a:endCxn id="17" idx="1"/>
+          </p:cNvCxnSpPr>
+          <p:nvPr/>
+        </p:nvCxnSpPr>
+        <p:spPr>
+          <a:xfrm>
+            <a:off x="2099876" y="3702613"/>
+            <a:ext cx="2190396" cy="1045977"/>
+          </a:xfrm>
+          <a:prstGeom prst="straightConnector1">
+            <a:avLst/>
+          </a:prstGeom>
+          <a:ln>
+            <a:solidFill>
+              <a:schemeClr val="tx1"/>
+            </a:solidFill>
+            <a:headEnd type="none"/>
+            <a:tailEnd type="triangle"/>
+          </a:ln>
+        </p:spPr>
+        <p:style>
+          <a:lnRef idx="1">
+            <a:schemeClr val="accent1"/>
+          </a:lnRef>
+          <a:fillRef idx="0">
+            <a:schemeClr val="accent1"/>
+          </a:fillRef>
+          <a:effectRef idx="0">
+            <a:schemeClr val="accent1"/>
+          </a:effectRef>
+          <a:fontRef idx="minor">
+            <a:schemeClr val="tx1"/>
+          </a:fontRef>
+        </p:style>
+      </p:cxnSp>
+    </p:spTree>
+    <p:extLst>
+      <p:ext uri="{BB962C8B-B14F-4D97-AF65-F5344CB8AC3E}">
+        <p14:creationId xmlns:p14="http://schemas.microsoft.com/office/powerpoint/2010/main" val="3763482898"/>
       </p:ext>
     </p:extLst>
   </p:cSld>
@@ -5814,7 +7359,7 @@
 </file>
 
 <file path=customXml/itemProps2.xml><?xml version="1.0" encoding="utf-8"?>
-<ds:datastoreItem xmlns:ds="http://schemas.openxmlformats.org/officeDocument/2006/customXml" ds:itemID="{BEFADC63-7CC0-4323-B645-60FEF28B9018}">
+<ds:datastoreItem xmlns:ds="http://schemas.openxmlformats.org/officeDocument/2006/customXml" ds:itemID="{61FEEFEA-449A-497B-A543-19A3C677D43D}">
   <ds:schemaRefs>
     <ds:schemaRef ds:uri="http://www.w3.org/2001/XMLSchema"/>
     <ds:schemaRef ds:uri="http://www.boldonjames.com/2008/01/sie/internal/label"/>

</xml_diff>